<commit_message>
Add generated LinkedIn draft
</commit_message>
<xml_diff>
--- a/drafts/linkedin_carousel.pptx
+++ b/drafts/linkedin_carousel.pptx
@@ -3179,7 +3179,7 @@
               <a:defRPr sz="2000"/>
             </a:pPr>
             <a:r>
-              <a:t>Leading player in renewable energy</a:t>
+              <a:t>Leading energy provider in India</a:t>
             </a:r>
           </a:p>
           <a:p>
@@ -3187,7 +3187,7 @@
               <a:defRPr sz="2000"/>
             </a:pPr>
             <a:r>
-              <a:t>Focus on sustainable development</a:t>
+              <a:t>Focus on renewable energy initiatives</a:t>
             </a:r>
           </a:p>
         </p:txBody>
@@ -3264,7 +3264,7 @@
               </a:defRPr>
             </a:pPr>
             <a:r>
-              <a:t>Bhuj Solar Project Expansion</a:t>
+              <a:t>Recent Solar Capacity Addition</a:t>
             </a:r>
           </a:p>
         </p:txBody>
@@ -3296,7 +3296,7 @@
               <a:defRPr sz="2000"/>
             </a:pPr>
             <a:r>
-              <a:t>Recent addition of 37.5 MW</a:t>
+              <a:t>Added 37.5 MW in Gujarat</a:t>
             </a:r>
           </a:p>
           <a:p>
@@ -3304,7 +3304,7 @@
               <a:defRPr sz="2000"/>
             </a:pPr>
             <a:r>
-              <a:t>Strategic growth in solar capacity</a:t>
+              <a:t>Strengthening renewable portfolio</a:t>
             </a:r>
           </a:p>
         </p:txBody>
@@ -3381,7 +3381,7 @@
               </a:defRPr>
             </a:pPr>
             <a:r>
-              <a:t>Total Capacity Achieved</a:t>
+              <a:t>Total Group Capacity</a:t>
             </a:r>
           </a:p>
         </p:txBody>
@@ -3413,7 +3413,7 @@
               <a:defRPr sz="2000"/>
             </a:pPr>
             <a:r>
-              <a:t>Overall capacity now 8,347.78 MW</a:t>
+              <a:t>Reaches 8,347.78 MW</a:t>
             </a:r>
           </a:p>
           <a:p>
@@ -3421,7 +3421,7 @@
               <a:defRPr sz="2000"/>
             </a:pPr>
             <a:r>
-              <a:t>Significant milestone for NTPC</a:t>
+              <a:t>Diverse energy sources for sustainability</a:t>
             </a:r>
           </a:p>
         </p:txBody>
@@ -3498,7 +3498,7 @@
               </a:defRPr>
             </a:pPr>
             <a:r>
-              <a:t>Impact on Renewable Energy Sector</a:t>
+              <a:t>Significance of Expansion</a:t>
             </a:r>
           </a:p>
         </p:txBody>
@@ -3530,7 +3530,7 @@
               <a:defRPr sz="2000"/>
             </a:pPr>
             <a:r>
-              <a:t>Support for clean energy transition</a:t>
+              <a:t>Supports India’s clean energy goals</a:t>
             </a:r>
           </a:p>
           <a:p>
@@ -3538,7 +3538,7 @@
               <a:defRPr sz="2000"/>
             </a:pPr>
             <a:r>
-              <a:t>Contribution to national energy goals</a:t>
+              <a:t>Enhances energy security and reliability</a:t>
             </a:r>
           </a:p>
         </p:txBody>
@@ -3615,7 +3615,7 @@
               </a:defRPr>
             </a:pPr>
             <a:r>
-              <a:t>Future Plans for NTPC</a:t>
+              <a:t>Future Prospects</a:t>
             </a:r>
           </a:p>
         </p:txBody>
@@ -3647,7 +3647,7 @@
               <a:defRPr sz="2000"/>
             </a:pPr>
             <a:r>
-              <a:t>Continued investment in green projects</a:t>
+              <a:t>Continued investments in green energy</a:t>
             </a:r>
           </a:p>
           <a:p>
@@ -3655,7 +3655,7 @@
               <a:defRPr sz="2000"/>
             </a:pPr>
             <a:r>
-              <a:t>Expansion of renewable capacity</a:t>
+              <a:t>Commitment to carbon neutrality</a:t>
             </a:r>
           </a:p>
         </p:txBody>
@@ -3732,7 +3732,7 @@
               </a:defRPr>
             </a:pPr>
             <a:r>
-              <a:t>Conclusion and Key Takeaways</a:t>
+              <a:t>Conclusion</a:t>
             </a:r>
           </a:p>
         </p:txBody>
@@ -3764,7 +3764,7 @@
               <a:defRPr sz="2000"/>
             </a:pPr>
             <a:r>
-              <a:t>Commitment to sustainability</a:t>
+              <a:t>NTPC leads in renewable growth</a:t>
             </a:r>
           </a:p>
           <a:p>
@@ -3772,7 +3772,7 @@
               <a:defRPr sz="2000"/>
             </a:pPr>
             <a:r>
-              <a:t>Role in energy security enhancement</a:t>
+              <a:t>Positive impact on environment and society</a:t>
             </a:r>
           </a:p>
         </p:txBody>

</xml_diff>

<commit_message>
Generate LinkedIn draft + prompts
</commit_message>
<xml_diff>
--- a/drafts/linkedin_carousel.pptx
+++ b/drafts/linkedin_carousel.pptx
@@ -6,11 +6,6 @@
   </p:sldMasterIdLst>
   <p:sldIdLst>
     <p:sldId id="256" r:id="rId7"/>
-    <p:sldId id="257" r:id="rId8"/>
-    <p:sldId id="258" r:id="rId9"/>
-    <p:sldId id="259" r:id="rId10"/>
-    <p:sldId id="260" r:id="rId11"/>
-    <p:sldId id="261" r:id="rId12"/>
   </p:sldIdLst>
   <p:sldSz cx="9144000" cy="6858000" type="screen4x3"/>
   <p:notesSz cx="6858000" cy="9144000"/>
@@ -3109,10 +3104,10 @@
           <a:lstStyle/>
           <a:p>
             <a:pPr>
-              <a:defRPr sz="2800" b="1"/>
+              <a:defRPr sz="3200" b="1"/>
             </a:pPr>
             <a:r>
-              <a:t>Saudi of green energy? Andhra's $10 bn green ammonia hub nears reality - Business Standard</a:t>
+              <a:t>NTPC Green Energy board okays 50:50 JV with GAIL</a:t>
             </a:r>
           </a:p>
         </p:txBody>
@@ -3137,7 +3132,7 @@
               <a:defRPr sz="1600"/>
             </a:pPr>
             <a:r>
-              <a:t>Andhra Pradesh is developing a $10 billion green ammonia hub.</a:t>
+              <a:t>&lt;a href="https://news.google.com/rss/articles/CBMilwFBVV95cUxOTy1QWnlsUWdnZzIxMS1PN01PRjA2ZFlUbEV0eHYwODRncm5VekVBS214TDUwMk9GLWZlVGZ6NUlZMFd1T3BlcGVoY0FTbk9selhyc21QSkdiekl6VkRXb3lXT2tNUGpQWXN5dFBTQzJSZHhHYUI1OV9ZdTNsMWk2dnY5VmRZZElPbGpBSHJNY3lSWU5JcHFN?oc=5" target="_blank"&gt;NTPC Green Energy board okays 50:50 JV with GAIL&lt;/a&gt;&amp;nbsp;&amp;nbsp;&lt;font color="#6f6f6f"&gt;India Infoline&lt;/font&gt;</a:t>
             </a:r>
           </a:p>
           <a:p>
@@ -3145,7 +3140,15 @@
               <a:defRPr sz="1600"/>
             </a:pPr>
             <a:r>
-              <a:t>The project aims to position Andhra Pradesh as a leader in green energy.</a:t>
+              <a:t>Strategic boost to India’s renewable ecosystem</a:t>
+            </a:r>
+          </a:p>
+          <a:p>
+            <a:pPr lvl="1">
+              <a:defRPr sz="1600"/>
+            </a:pPr>
+            <a:r>
+              <a:t>Supports long-term clean energy transition</a:t>
             </a:r>
           </a:p>
         </p:txBody>
@@ -3166,503 +3169,8 @@
         </p:blipFill>
         <p:spPr>
           <a:xfrm>
-            <a:off x="457200" y="1600200"/>
-            <a:ext cx="8229600" cy="4525963"/>
-          </a:xfrm>
-          <a:prstGeom prst="rect">
-            <a:avLst/>
-          </a:prstGeom>
-        </p:spPr>
-      </p:pic>
-    </p:spTree>
-  </p:cSld>
-  <p:clrMapOvr>
-    <a:masterClrMapping/>
-  </p:clrMapOvr>
-</p:sld>
-</file>
-
-<file path=ppt/slides/slide2.xml><?xml version="1.0" encoding="utf-8"?>
-<p:sld xmlns:a="http://schemas.openxmlformats.org/drawingml/2006/main" xmlns:p="http://schemas.openxmlformats.org/presentationml/2006/main" xmlns:r="http://schemas.openxmlformats.org/officeDocument/2006/relationships">
-  <p:cSld>
-    <p:spTree>
-      <p:nvGrpSpPr>
-        <p:cNvPr id="1" name=""/>
-        <p:cNvGrpSpPr/>
-        <p:nvPr/>
-      </p:nvGrpSpPr>
-      <p:grpSpPr/>
-      <p:sp>
-        <p:nvSpPr>
-          <p:cNvPr id="2" name="Title 1"/>
-          <p:cNvSpPr>
-            <a:spLocks noGrp="1"/>
-          </p:cNvSpPr>
-          <p:nvPr>
-            <p:ph type="title"/>
-          </p:nvPr>
-        </p:nvSpPr>
-        <p:spPr/>
-        <p:txBody>
-          <a:bodyPr/>
-          <a:lstStyle/>
-          <a:p>
-            <a:pPr>
-              <a:defRPr sz="2800" b="1"/>
-            </a:pPr>
-            <a:r>
-              <a:t>Saudi of green energy? Andhra's $10 bn green ammonia hub nears reality - Business Standard</a:t>
-            </a:r>
-          </a:p>
-        </p:txBody>
-      </p:sp>
-      <p:sp>
-        <p:nvSpPr>
-          <p:cNvPr id="3" name="Content Placeholder 2"/>
-          <p:cNvSpPr>
-            <a:spLocks noGrp="1"/>
-          </p:cNvSpPr>
-          <p:nvPr>
-            <p:ph idx="1"/>
-          </p:nvPr>
-        </p:nvSpPr>
-        <p:spPr/>
-        <p:txBody>
-          <a:bodyPr/>
-          <a:lstStyle/>
-          <a:p/>
-          <a:p>
-            <a:pPr lvl="1">
-              <a:defRPr sz="1600"/>
-            </a:pPr>
-            <a:r>
-              <a:t>The green ammonia hub is expected to have a significant impact on the local economy.</a:t>
-            </a:r>
-          </a:p>
-          <a:p>
-            <a:pPr lvl="1">
-              <a:defRPr sz="1600"/>
-            </a:pPr>
-            <a:r>
-              <a:t>It will create numerous job opportunities in the region.</a:t>
-            </a:r>
-          </a:p>
-        </p:txBody>
-      </p:sp>
-      <p:pic>
-        <p:nvPicPr>
-          <p:cNvPr id="4" name="Picture 3" descr="slide_1.png"/>
-          <p:cNvPicPr>
-            <a:picLocks noChangeAspect="1"/>
-          </p:cNvPicPr>
-          <p:nvPr/>
-        </p:nvPicPr>
-        <p:blipFill>
-          <a:blip r:embed="rId2"/>
-          <a:stretch>
-            <a:fillRect/>
-          </a:stretch>
-        </p:blipFill>
-        <p:spPr>
-          <a:xfrm>
-            <a:off x="457200" y="1600200"/>
-            <a:ext cx="8229600" cy="4525963"/>
-          </a:xfrm>
-          <a:prstGeom prst="rect">
-            <a:avLst/>
-          </a:prstGeom>
-        </p:spPr>
-      </p:pic>
-    </p:spTree>
-  </p:cSld>
-  <p:clrMapOvr>
-    <a:masterClrMapping/>
-  </p:clrMapOvr>
-</p:sld>
-</file>
-
-<file path=ppt/slides/slide3.xml><?xml version="1.0" encoding="utf-8"?>
-<p:sld xmlns:a="http://schemas.openxmlformats.org/drawingml/2006/main" xmlns:p="http://schemas.openxmlformats.org/presentationml/2006/main" xmlns:r="http://schemas.openxmlformats.org/officeDocument/2006/relationships">
-  <p:cSld>
-    <p:spTree>
-      <p:nvGrpSpPr>
-        <p:cNvPr id="1" name=""/>
-        <p:cNvGrpSpPr/>
-        <p:nvPr/>
-      </p:nvGrpSpPr>
-      <p:grpSpPr/>
-      <p:sp>
-        <p:nvSpPr>
-          <p:cNvPr id="2" name="Title 1"/>
-          <p:cNvSpPr>
-            <a:spLocks noGrp="1"/>
-          </p:cNvSpPr>
-          <p:nvPr>
-            <p:ph type="title"/>
-          </p:nvPr>
-        </p:nvSpPr>
-        <p:spPr/>
-        <p:txBody>
-          <a:bodyPr/>
-          <a:lstStyle/>
-          <a:p>
-            <a:pPr>
-              <a:defRPr sz="2800" b="1"/>
-            </a:pPr>
-            <a:r>
-              <a:t>Saudi of green energy? Andhra's $10 bn green ammonia hub nears reality - Business Standard</a:t>
-            </a:r>
-          </a:p>
-        </p:txBody>
-      </p:sp>
-      <p:sp>
-        <p:nvSpPr>
-          <p:cNvPr id="3" name="Content Placeholder 2"/>
-          <p:cNvSpPr>
-            <a:spLocks noGrp="1"/>
-          </p:cNvSpPr>
-          <p:nvPr>
-            <p:ph idx="1"/>
-          </p:nvPr>
-        </p:nvSpPr>
-        <p:spPr/>
-        <p:txBody>
-          <a:bodyPr/>
-          <a:lstStyle/>
-          <a:p/>
-          <a:p>
-            <a:pPr lvl="1">
-              <a:defRPr sz="1600"/>
-            </a:pPr>
-            <a:r>
-              <a:t>The hub will utilize renewable energy sources for ammonia production.</a:t>
-            </a:r>
-          </a:p>
-          <a:p>
-            <a:pPr lvl="1">
-              <a:defRPr sz="1600"/>
-            </a:pPr>
-            <a:r>
-              <a:t>It is part of a broader initiative to enhance sustainable energy practices.</a:t>
-            </a:r>
-          </a:p>
-        </p:txBody>
-      </p:sp>
-      <p:pic>
-        <p:nvPicPr>
-          <p:cNvPr id="4" name="Picture 3" descr="slide_1.png"/>
-          <p:cNvPicPr>
-            <a:picLocks noChangeAspect="1"/>
-          </p:cNvPicPr>
-          <p:nvPr/>
-        </p:nvPicPr>
-        <p:blipFill>
-          <a:blip r:embed="rId2"/>
-          <a:stretch>
-            <a:fillRect/>
-          </a:stretch>
-        </p:blipFill>
-        <p:spPr>
-          <a:xfrm>
-            <a:off x="457200" y="1600200"/>
-            <a:ext cx="8229600" cy="4525963"/>
-          </a:xfrm>
-          <a:prstGeom prst="rect">
-            <a:avLst/>
-          </a:prstGeom>
-        </p:spPr>
-      </p:pic>
-    </p:spTree>
-  </p:cSld>
-  <p:clrMapOvr>
-    <a:masterClrMapping/>
-  </p:clrMapOvr>
-</p:sld>
-</file>
-
-<file path=ppt/slides/slide4.xml><?xml version="1.0" encoding="utf-8"?>
-<p:sld xmlns:a="http://schemas.openxmlformats.org/drawingml/2006/main" xmlns:p="http://schemas.openxmlformats.org/presentationml/2006/main" xmlns:r="http://schemas.openxmlformats.org/officeDocument/2006/relationships">
-  <p:cSld>
-    <p:spTree>
-      <p:nvGrpSpPr>
-        <p:cNvPr id="1" name=""/>
-        <p:cNvGrpSpPr/>
-        <p:nvPr/>
-      </p:nvGrpSpPr>
-      <p:grpSpPr/>
-      <p:sp>
-        <p:nvSpPr>
-          <p:cNvPr id="2" name="Title 1"/>
-          <p:cNvSpPr>
-            <a:spLocks noGrp="1"/>
-          </p:cNvSpPr>
-          <p:nvPr>
-            <p:ph type="title"/>
-          </p:nvPr>
-        </p:nvSpPr>
-        <p:spPr/>
-        <p:txBody>
-          <a:bodyPr/>
-          <a:lstStyle/>
-          <a:p>
-            <a:pPr>
-              <a:defRPr sz="2800" b="1"/>
-            </a:pPr>
-            <a:r>
-              <a:t>Saudi of green energy? Andhra's $10 bn green ammonia hub nears reality - Business Standard</a:t>
-            </a:r>
-          </a:p>
-        </p:txBody>
-      </p:sp>
-      <p:sp>
-        <p:nvSpPr>
-          <p:cNvPr id="3" name="Content Placeholder 2"/>
-          <p:cNvSpPr>
-            <a:spLocks noGrp="1"/>
-          </p:cNvSpPr>
-          <p:nvPr>
-            <p:ph idx="1"/>
-          </p:nvPr>
-        </p:nvSpPr>
-        <p:spPr/>
-        <p:txBody>
-          <a:bodyPr/>
-          <a:lstStyle/>
-          <a:p/>
-          <a:p>
-            <a:pPr lvl="1">
-              <a:defRPr sz="1600"/>
-            </a:pPr>
-            <a:r>
-              <a:t>The project is expected to attract both domestic and international investments.</a:t>
-            </a:r>
-          </a:p>
-          <a:p>
-            <a:pPr lvl="1">
-              <a:defRPr sz="1600"/>
-            </a:pPr>
-            <a:r>
-              <a:t>It aims to meet the growing global demand for green ammonia.</a:t>
-            </a:r>
-          </a:p>
-        </p:txBody>
-      </p:sp>
-      <p:pic>
-        <p:nvPicPr>
-          <p:cNvPr id="4" name="Picture 3" descr="slide_1.png"/>
-          <p:cNvPicPr>
-            <a:picLocks noChangeAspect="1"/>
-          </p:cNvPicPr>
-          <p:nvPr/>
-        </p:nvPicPr>
-        <p:blipFill>
-          <a:blip r:embed="rId2"/>
-          <a:stretch>
-            <a:fillRect/>
-          </a:stretch>
-        </p:blipFill>
-        <p:spPr>
-          <a:xfrm>
-            <a:off x="457200" y="1600200"/>
-            <a:ext cx="8229600" cy="4525963"/>
-          </a:xfrm>
-          <a:prstGeom prst="rect">
-            <a:avLst/>
-          </a:prstGeom>
-        </p:spPr>
-      </p:pic>
-    </p:spTree>
-  </p:cSld>
-  <p:clrMapOvr>
-    <a:masterClrMapping/>
-  </p:clrMapOvr>
-</p:sld>
-</file>
-
-<file path=ppt/slides/slide5.xml><?xml version="1.0" encoding="utf-8"?>
-<p:sld xmlns:a="http://schemas.openxmlformats.org/drawingml/2006/main" xmlns:p="http://schemas.openxmlformats.org/presentationml/2006/main" xmlns:r="http://schemas.openxmlformats.org/officeDocument/2006/relationships">
-  <p:cSld>
-    <p:spTree>
-      <p:nvGrpSpPr>
-        <p:cNvPr id="1" name=""/>
-        <p:cNvGrpSpPr/>
-        <p:nvPr/>
-      </p:nvGrpSpPr>
-      <p:grpSpPr/>
-      <p:sp>
-        <p:nvSpPr>
-          <p:cNvPr id="2" name="Title 1"/>
-          <p:cNvSpPr>
-            <a:spLocks noGrp="1"/>
-          </p:cNvSpPr>
-          <p:nvPr>
-            <p:ph type="title"/>
-          </p:nvPr>
-        </p:nvSpPr>
-        <p:spPr/>
-        <p:txBody>
-          <a:bodyPr/>
-          <a:lstStyle/>
-          <a:p>
-            <a:pPr>
-              <a:defRPr sz="2800" b="1"/>
-            </a:pPr>
-            <a:r>
-              <a:t>Saudi of green energy? Andhra's $10 bn green ammonia hub nears reality - Business Standard</a:t>
-            </a:r>
-          </a:p>
-        </p:txBody>
-      </p:sp>
-      <p:sp>
-        <p:nvSpPr>
-          <p:cNvPr id="3" name="Content Placeholder 2"/>
-          <p:cNvSpPr>
-            <a:spLocks noGrp="1"/>
-          </p:cNvSpPr>
-          <p:nvPr>
-            <p:ph idx="1"/>
-          </p:nvPr>
-        </p:nvSpPr>
-        <p:spPr/>
-        <p:txBody>
-          <a:bodyPr/>
-          <a:lstStyle/>
-          <a:p/>
-          <a:p>
-            <a:pPr lvl="1">
-              <a:defRPr sz="1600"/>
-            </a:pPr>
-            <a:r>
-              <a:t>The hub will contribute to reducing carbon emissions in the region.</a:t>
-            </a:r>
-          </a:p>
-          <a:p>
-            <a:pPr lvl="1">
-              <a:defRPr sz="1600"/>
-            </a:pPr>
-            <a:r>
-              <a:t>It aligns with India's commitment to sustainable development goals.</a:t>
-            </a:r>
-          </a:p>
-        </p:txBody>
-      </p:sp>
-      <p:pic>
-        <p:nvPicPr>
-          <p:cNvPr id="4" name="Picture 3" descr="slide_1.png"/>
-          <p:cNvPicPr>
-            <a:picLocks noChangeAspect="1"/>
-          </p:cNvPicPr>
-          <p:nvPr/>
-        </p:nvPicPr>
-        <p:blipFill>
-          <a:blip r:embed="rId2"/>
-          <a:stretch>
-            <a:fillRect/>
-          </a:stretch>
-        </p:blipFill>
-        <p:spPr>
-          <a:xfrm>
-            <a:off x="457200" y="1600200"/>
-            <a:ext cx="8229600" cy="4525963"/>
-          </a:xfrm>
-          <a:prstGeom prst="rect">
-            <a:avLst/>
-          </a:prstGeom>
-        </p:spPr>
-      </p:pic>
-    </p:spTree>
-  </p:cSld>
-  <p:clrMapOvr>
-    <a:masterClrMapping/>
-  </p:clrMapOvr>
-</p:sld>
-</file>
-
-<file path=ppt/slides/slide6.xml><?xml version="1.0" encoding="utf-8"?>
-<p:sld xmlns:a="http://schemas.openxmlformats.org/drawingml/2006/main" xmlns:p="http://schemas.openxmlformats.org/presentationml/2006/main" xmlns:r="http://schemas.openxmlformats.org/officeDocument/2006/relationships">
-  <p:cSld>
-    <p:spTree>
-      <p:nvGrpSpPr>
-        <p:cNvPr id="1" name=""/>
-        <p:cNvGrpSpPr/>
-        <p:nvPr/>
-      </p:nvGrpSpPr>
-      <p:grpSpPr/>
-      <p:sp>
-        <p:nvSpPr>
-          <p:cNvPr id="2" name="Title 1"/>
-          <p:cNvSpPr>
-            <a:spLocks noGrp="1"/>
-          </p:cNvSpPr>
-          <p:nvPr>
-            <p:ph type="title"/>
-          </p:nvPr>
-        </p:nvSpPr>
-        <p:spPr/>
-        <p:txBody>
-          <a:bodyPr/>
-          <a:lstStyle/>
-          <a:p>
-            <a:pPr>
-              <a:defRPr sz="2800" b="1"/>
-            </a:pPr>
-            <a:r>
-              <a:t>Saudi of green energy? Andhra's $10 bn green ammonia hub nears reality - Business Standard</a:t>
-            </a:r>
-          </a:p>
-        </p:txBody>
-      </p:sp>
-      <p:sp>
-        <p:nvSpPr>
-          <p:cNvPr id="3" name="Content Placeholder 2"/>
-          <p:cNvSpPr>
-            <a:spLocks noGrp="1"/>
-          </p:cNvSpPr>
-          <p:nvPr>
-            <p:ph idx="1"/>
-          </p:nvPr>
-        </p:nvSpPr>
-        <p:spPr/>
-        <p:txBody>
-          <a:bodyPr/>
-          <a:lstStyle/>
-          <a:p/>
-          <a:p>
-            <a:pPr lvl="1">
-              <a:defRPr sz="1600"/>
-            </a:pPr>
-            <a:r>
-              <a:t>The project is in advanced stages of planning and development.</a:t>
-            </a:r>
-          </a:p>
-          <a:p>
-            <a:pPr lvl="1">
-              <a:defRPr sz="1600"/>
-            </a:pPr>
-            <a:r>
-              <a:t>It is expected to play a crucial role in the energy transition in India.</a:t>
-            </a:r>
-          </a:p>
-        </p:txBody>
-      </p:sp>
-      <p:pic>
-        <p:nvPicPr>
-          <p:cNvPr id="4" name="Picture 3" descr="slide_1.png"/>
-          <p:cNvPicPr>
-            <a:picLocks noChangeAspect="1"/>
-          </p:cNvPicPr>
-          <p:nvPr/>
-        </p:nvPicPr>
-        <p:blipFill>
-          <a:blip r:embed="rId2"/>
-          <a:stretch>
-            <a:fillRect/>
-          </a:stretch>
-        </p:blipFill>
-        <p:spPr>
-          <a:xfrm>
-            <a:off x="457200" y="1600200"/>
-            <a:ext cx="8229600" cy="4525963"/>
+            <a:off x="914400" y="1828800"/>
+            <a:ext cx="7315200" cy="3200400"/>
           </a:xfrm>
           <a:prstGeom prst="rect">
             <a:avLst/>

</xml_diff>